<commit_message>
reworded one slide for clarification
</commit_message>
<xml_diff>
--- a/PowerPoints/10 - CVM.pptx
+++ b/PowerPoints/10 - CVM.pptx
@@ -22330,7 +22330,7 @@
               <a:rPr lang="en-US" dirty="0">
                 <a:cs typeface="Arial" pitchFamily="34" charset="0"/>
               </a:rPr>
-              <a:t>Some instructions take one or two immediate operands, which are always located in the bytes immediately following the instruction in memory.</a:t>
+              <a:t>Some instructions take an immediate operand, which is always located immediately following the instruction in memory.</a:t>
             </a:r>
           </a:p>
           <a:p>
@@ -22338,7 +22338,7 @@
               <a:rPr lang="en-US" dirty="0">
                 <a:cs typeface="Arial" pitchFamily="34" charset="0"/>
               </a:rPr>
-              <a:t>Depending on the opcode, an argument can be</a:t>
+              <a:t>Depending on the opcode, an immediate operand can be</a:t>
             </a:r>
           </a:p>
           <a:p>
@@ -22371,11 +22371,14 @@
           <a:p>
             <a:pPr lvl="1"/>
             <a:r>
-              <a:rPr lang="en-US" dirty="0">
+              <a:rPr lang="en-US">
                 <a:cs typeface="Arial" pitchFamily="34" charset="0"/>
               </a:rPr>
               <a:t>multiple bytes (e.g., for a string literal)</a:t>
             </a:r>
+            <a:endParaRPr lang="en-US" dirty="0">
+              <a:cs typeface="Arial" pitchFamily="34" charset="0"/>
+            </a:endParaRPr>
           </a:p>
         </p:txBody>
       </p:sp>

</xml_diff>